<commit_message>
Modified the examples for the first presentation
</commit_message>
<xml_diff>
--- a/WebLectures/Presentations/HTML & CSS Basics.pptx
+++ b/WebLectures/Presentations/HTML & CSS Basics.pptx
@@ -141,6 +141,11 @@
       </a:defRPr>
     </a:lvl9pPr>
   </p:defaultTextStyle>
+  <p:extLst>
+    <p:ext uri="{EFAFB233-063F-42B5-8137-9DF3F51BA10A}">
+      <p15:sldGuideLst xmlns:p15="http://schemas.microsoft.com/office/powerpoint/2012/main"/>
+    </p:ext>
+  </p:extLst>
 </p:presentation>
 </file>
 
@@ -327,7 +332,7 @@
           <a:p>
             <a:fld id="{E2BBAC0D-8825-4A47-9E7F-EDCBDFB91AA8}" type="datetimeFigureOut">
               <a:rPr lang="bg-BG" smtClean="0"/>
-              <a:t>6.7.2015 г.</a:t>
+              <a:t>7.7.2015 г.</a:t>
             </a:fld>
             <a:endParaRPr lang="bg-BG"/>
           </a:p>
@@ -855,7 +860,7 @@
           <a:p>
             <a:fld id="{E2BBAC0D-8825-4A47-9E7F-EDCBDFB91AA8}" type="datetimeFigureOut">
               <a:rPr lang="bg-BG" smtClean="0"/>
-              <a:t>6.7.2015 г.</a:t>
+              <a:t>7.7.2015 г.</a:t>
             </a:fld>
             <a:endParaRPr lang="bg-BG" dirty="0"/>
           </a:p>
@@ -1356,7 +1361,7 @@
           <a:p>
             <a:fld id="{E2BBAC0D-8825-4A47-9E7F-EDCBDFB91AA8}" type="datetimeFigureOut">
               <a:rPr lang="bg-BG" smtClean="0"/>
-              <a:t>6.7.2015 г.</a:t>
+              <a:t>7.7.2015 г.</a:t>
             </a:fld>
             <a:endParaRPr lang="bg-BG" dirty="0"/>
           </a:p>
@@ -2249,7 +2254,7 @@
           <a:p>
             <a:fld id="{E2BBAC0D-8825-4A47-9E7F-EDCBDFB91AA8}" type="datetimeFigureOut">
               <a:rPr lang="bg-BG" smtClean="0"/>
-              <a:t>6.7.2015 г.</a:t>
+              <a:t>7.7.2015 г.</a:t>
             </a:fld>
             <a:endParaRPr lang="bg-BG" dirty="0"/>
           </a:p>
@@ -2997,7 +3002,7 @@
           <a:p>
             <a:fld id="{E2BBAC0D-8825-4A47-9E7F-EDCBDFB91AA8}" type="datetimeFigureOut">
               <a:rPr lang="bg-BG" smtClean="0"/>
-              <a:t>6.7.2015 г.</a:t>
+              <a:t>7.7.2015 г.</a:t>
             </a:fld>
             <a:endParaRPr lang="bg-BG"/>
           </a:p>
@@ -3392,7 +3397,7 @@
           <a:p>
             <a:fld id="{E2BBAC0D-8825-4A47-9E7F-EDCBDFB91AA8}" type="datetimeFigureOut">
               <a:rPr lang="bg-BG" smtClean="0"/>
-              <a:t>6.7.2015 г.</a:t>
+              <a:t>7.7.2015 г.</a:t>
             </a:fld>
             <a:endParaRPr lang="bg-BG" dirty="0"/>
           </a:p>
@@ -4260,7 +4265,7 @@
           <a:p>
             <a:fld id="{E2BBAC0D-8825-4A47-9E7F-EDCBDFB91AA8}" type="datetimeFigureOut">
               <a:rPr lang="bg-BG" smtClean="0"/>
-              <a:t>6.7.2015 г.</a:t>
+              <a:t>7.7.2015 г.</a:t>
             </a:fld>
             <a:endParaRPr lang="bg-BG" dirty="0"/>
           </a:p>
@@ -4856,7 +4861,7 @@
           <a:p>
             <a:fld id="{E2BBAC0D-8825-4A47-9E7F-EDCBDFB91AA8}" type="datetimeFigureOut">
               <a:rPr lang="bg-BG" smtClean="0"/>
-              <a:t>6.7.2015 г.</a:t>
+              <a:t>7.7.2015 г.</a:t>
             </a:fld>
             <a:endParaRPr lang="bg-BG" dirty="0"/>
           </a:p>
@@ -6380,7 +6385,7 @@
           <a:p>
             <a:fld id="{E2BBAC0D-8825-4A47-9E7F-EDCBDFB91AA8}" type="datetimeFigureOut">
               <a:rPr lang="bg-BG" smtClean="0"/>
-              <a:t>6.7.2015 г.</a:t>
+              <a:t>7.7.2015 г.</a:t>
             </a:fld>
             <a:endParaRPr lang="bg-BG" dirty="0"/>
           </a:p>
@@ -7777,7 +7782,7 @@
           <a:p>
             <a:fld id="{E2BBAC0D-8825-4A47-9E7F-EDCBDFB91AA8}" type="datetimeFigureOut">
               <a:rPr lang="bg-BG" smtClean="0"/>
-              <a:t>6.7.2015 г.</a:t>
+              <a:t>7.7.2015 г.</a:t>
             </a:fld>
             <a:endParaRPr lang="bg-BG" dirty="0"/>
           </a:p>
@@ -8066,7 +8071,7 @@
           <a:p>
             <a:fld id="{E2BBAC0D-8825-4A47-9E7F-EDCBDFB91AA8}" type="datetimeFigureOut">
               <a:rPr lang="bg-BG" smtClean="0"/>
-              <a:t>6.7.2015 г.</a:t>
+              <a:t>7.7.2015 г.</a:t>
             </a:fld>
             <a:endParaRPr lang="bg-BG" dirty="0"/>
           </a:p>
@@ -8463,7 +8468,7 @@
           <a:p>
             <a:fld id="{E2BBAC0D-8825-4A47-9E7F-EDCBDFB91AA8}" type="datetimeFigureOut">
               <a:rPr lang="bg-BG" smtClean="0"/>
-              <a:t>6.7.2015 г.</a:t>
+              <a:t>7.7.2015 г.</a:t>
             </a:fld>
             <a:endParaRPr lang="bg-BG" dirty="0"/>
           </a:p>
@@ -9539,7 +9544,7 @@
           <a:p>
             <a:fld id="{E2BBAC0D-8825-4A47-9E7F-EDCBDFB91AA8}" type="datetimeFigureOut">
               <a:rPr lang="bg-BG" smtClean="0"/>
-              <a:t>6.7.2015 г.</a:t>
+              <a:t>7.7.2015 г.</a:t>
             </a:fld>
             <a:endParaRPr lang="bg-BG" dirty="0"/>
           </a:p>
@@ -10131,13 +10136,13 @@
   <p:clrMapOvr>
     <a:masterClrMapping/>
   </p:clrMapOvr>
-  <mc:AlternateContent xmlns:mc="http://schemas.openxmlformats.org/markup-compatibility/2006">
-    <mc:Choice xmlns:p14="http://schemas.microsoft.com/office/powerpoint/2010/main" Requires="p14">
+  <mc:AlternateContent xmlns:mc="http://schemas.openxmlformats.org/markup-compatibility/2006" xmlns:p14="http://schemas.microsoft.com/office/powerpoint/2010/main">
+    <mc:Choice Requires="p14">
       <p:transition spd="med" p14:dur="700">
         <p:fade/>
       </p:transition>
     </mc:Choice>
-    <mc:Fallback>
+    <mc:Fallback xmlns="">
       <p:transition spd="med">
         <p:fade/>
       </p:transition>
@@ -11821,8 +11826,21 @@
                   <a:srgbClr val="34495D"/>
                 </a:solidFill>
               </a:rPr>
-              <a:t>: 100vw;</a:t>
-            </a:r>
+              <a:t>: </a:t>
+            </a:r>
+            <a:r>
+              <a:rPr lang="en-US" dirty="0" smtClean="0">
+                <a:solidFill>
+                  <a:srgbClr val="34495D"/>
+                </a:solidFill>
+              </a:rPr>
+              <a:t>100px;</a:t>
+            </a:r>
+            <a:endParaRPr lang="en-US" dirty="0" smtClean="0">
+              <a:solidFill>
+                <a:srgbClr val="34495D"/>
+              </a:solidFill>
+            </a:endParaRPr>
           </a:p>
           <a:p>
             <a:pPr indent="457200"/>
@@ -11919,8 +11937,21 @@
                   <a:srgbClr val="34495D"/>
                 </a:solidFill>
               </a:rPr>
-              <a:t>: 50vh;</a:t>
-            </a:r>
+              <a:t>: </a:t>
+            </a:r>
+            <a:r>
+              <a:rPr lang="en-US" dirty="0" smtClean="0">
+                <a:solidFill>
+                  <a:srgbClr val="34495D"/>
+                </a:solidFill>
+              </a:rPr>
+              <a:t>50px;</a:t>
+            </a:r>
+            <a:endParaRPr lang="en-US" dirty="0" smtClean="0">
+              <a:solidFill>
+                <a:srgbClr val="34495D"/>
+              </a:solidFill>
+            </a:endParaRPr>
           </a:p>
           <a:p>
             <a:pPr indent="457200"/>
@@ -12139,10 +12170,6 @@
               <a:rPr lang="en-US" dirty="0" smtClean="0"/>
               <a:t>Heights</a:t>
             </a:r>
-            <a:r>
-              <a:rPr lang="en-US" dirty="0" smtClean="0"/>
-              <a:t/>
-            </a:r>
             <a:br>
               <a:rPr lang="en-US" dirty="0" smtClean="0"/>
             </a:br>
@@ -12800,7 +12827,6 @@
               <a:rPr lang="en-US" dirty="0" smtClean="0"/>
               <a:t>HTML</a:t>
             </a:r>
-            <a:endParaRPr lang="en-US" dirty="0" smtClean="0"/>
           </a:p>
           <a:p>
             <a:pPr lvl="1"/>
@@ -12837,14 +12863,12 @@
               <a:rPr lang="en-US" dirty="0" smtClean="0"/>
               <a:t>Span</a:t>
             </a:r>
-            <a:endParaRPr lang="en-US" dirty="0" smtClean="0"/>
           </a:p>
           <a:p>
             <a:r>
               <a:rPr lang="en-US" dirty="0" smtClean="0"/>
               <a:t>CSS</a:t>
             </a:r>
-            <a:endParaRPr lang="en-US" dirty="0" smtClean="0"/>
           </a:p>
           <a:p>
             <a:pPr lvl="1"/>
@@ -12864,14 +12888,15 @@
             <a:pPr lvl="2"/>
             <a:r>
               <a:rPr lang="en-US" dirty="0" smtClean="0"/>
+              <a:t>Margin</a:t>
+            </a:r>
+            <a:endParaRPr lang="en-US" dirty="0" smtClean="0"/>
+          </a:p>
+          <a:p>
+            <a:pPr lvl="2"/>
+            <a:r>
+              <a:rPr lang="en-US" dirty="0" smtClean="0"/>
               <a:t>Padding</a:t>
-            </a:r>
-          </a:p>
-          <a:p>
-            <a:pPr lvl="2"/>
-            <a:r>
-              <a:rPr lang="en-US" dirty="0" smtClean="0"/>
-              <a:t>Margin</a:t>
             </a:r>
           </a:p>
           <a:p>
@@ -12885,7 +12910,11 @@
             <a:pPr lvl="1"/>
             <a:r>
               <a:rPr lang="en-US" dirty="0" smtClean="0"/>
-              <a:t>Positioning &amp; Displaying</a:t>
+              <a:t>Positioning </a:t>
+            </a:r>
+            <a:r>
+              <a:rPr lang="en-US" dirty="0" smtClean="0"/>
+              <a:t>&amp; Displaying</a:t>
             </a:r>
             <a:endParaRPr lang="bg-BG" dirty="0"/>
           </a:p>
@@ -13239,11 +13268,6 @@
               </a:rPr>
               <a:t>: dotted;</a:t>
             </a:r>
-            <a:endParaRPr lang="en-US" dirty="0" smtClean="0">
-              <a:solidFill>
-                <a:srgbClr val="34495D"/>
-              </a:solidFill>
-            </a:endParaRPr>
           </a:p>
           <a:p>
             <a:pPr indent="457200"/>
@@ -13649,7 +13673,15 @@
           <a:p>
             <a:r>
               <a:rPr lang="en-US" dirty="0"/>
-              <a:t>The default display value for most elements is </a:t>
+              <a:t>The default display </a:t>
+            </a:r>
+            <a:r>
+              <a:rPr lang="en-US"/>
+              <a:t>value </a:t>
+            </a:r>
+            <a:r>
+              <a:rPr lang="en-US" smtClean="0"/>
+              <a:t>is </a:t>
             </a:r>
             <a:r>
               <a:rPr lang="en-US" dirty="0">
@@ -15327,11 +15359,6 @@
               </a:rPr>
               <a:t>top: 0;</a:t>
             </a:r>
-            <a:endParaRPr lang="en-US" dirty="0" smtClean="0">
-              <a:solidFill>
-                <a:srgbClr val="34495D"/>
-              </a:solidFill>
-            </a:endParaRPr>
           </a:p>
           <a:p>
             <a:pPr indent="457200"/>
@@ -15449,11 +15476,6 @@
               </a:rPr>
               <a:t>bottom: 0;</a:t>
             </a:r>
-            <a:endParaRPr lang="en-US" dirty="0" smtClean="0">
-              <a:solidFill>
-                <a:srgbClr val="34495D"/>
-              </a:solidFill>
-            </a:endParaRPr>
           </a:p>
           <a:p>
             <a:pPr indent="457200"/>
@@ -15648,15 +15670,7 @@
                   <a:srgbClr val="34495D"/>
                 </a:solidFill>
               </a:rPr>
-              <a:t>fixed</a:t>
-            </a:r>
-            <a:r>
-              <a:rPr lang="en-US" dirty="0" smtClean="0">
-                <a:solidFill>
-                  <a:srgbClr val="34495D"/>
-                </a:solidFill>
-              </a:rPr>
-              <a:t>;</a:t>
+              <a:t>fixed;</a:t>
             </a:r>
           </a:p>
           <a:p>
@@ -17043,7 +17057,15 @@
                   <a:srgbClr val="E54C3B"/>
                 </a:solidFill>
               </a:rPr>
-              <a:t>Non (default)</a:t>
+              <a:t>None </a:t>
+            </a:r>
+            <a:r>
+              <a:rPr lang="en-US" dirty="0" smtClean="0">
+                <a:solidFill>
+                  <a:srgbClr val="E54C3B"/>
+                </a:solidFill>
+              </a:rPr>
+              <a:t>(default)</a:t>
             </a:r>
           </a:p>
         </p:txBody>
@@ -17125,15 +17147,7 @@
                   <a:srgbClr val="34495D"/>
                 </a:solidFill>
               </a:rPr>
-              <a:t>right</a:t>
-            </a:r>
-            <a:r>
-              <a:rPr lang="en-US" dirty="0" smtClean="0">
-                <a:solidFill>
-                  <a:srgbClr val="34495D"/>
-                </a:solidFill>
-              </a:rPr>
-              <a:t>;</a:t>
+              <a:t>right;</a:t>
             </a:r>
           </a:p>
           <a:p>
@@ -18369,7 +18383,15 @@
             </a:r>
             <a:r>
               <a:rPr lang="en-US" dirty="0"/>
-              <a:t>body of an HTML document where all of the content is placed</a:t>
+              <a:t>body of an HTML document </a:t>
+            </a:r>
+            <a:r>
+              <a:rPr lang="en-US" dirty="0" smtClean="0"/>
+              <a:t>is where </a:t>
+            </a:r>
+            <a:r>
+              <a:rPr lang="en-US" dirty="0"/>
+              <a:t>all of the content is placed</a:t>
             </a:r>
             <a:endParaRPr lang="en-US" dirty="0">
               <a:solidFill>
@@ -18447,11 +18469,6 @@
               </a:rPr>
               <a:t>&gt;</a:t>
             </a:r>
-            <a:endParaRPr lang="en-US" dirty="0" smtClean="0">
-              <a:solidFill>
-                <a:srgbClr val="34495D"/>
-              </a:solidFill>
-            </a:endParaRPr>
           </a:p>
           <a:p>
             <a:pPr indent="457200"/>
@@ -18461,21 +18478,8 @@
                   <a:srgbClr val="34495D"/>
                 </a:solidFill>
               </a:rPr>
-              <a:t>	</a:t>
-            </a:r>
-            <a:r>
-              <a:rPr lang="en-US" dirty="0" smtClean="0">
-                <a:solidFill>
-                  <a:srgbClr val="34495D"/>
-                </a:solidFill>
-              </a:rPr>
-              <a:t>&lt;title&gt;Sample page&lt;/title&gt;</a:t>
-            </a:r>
-            <a:endParaRPr lang="en-US" dirty="0" smtClean="0">
-              <a:solidFill>
-                <a:srgbClr val="34495D"/>
-              </a:solidFill>
-            </a:endParaRPr>
+              <a:t>	&lt;title&gt;Sample page&lt;/title&gt;</a:t>
+            </a:r>
           </a:p>
           <a:p>
             <a:pPr indent="457200"/>
@@ -18957,7 +18961,6 @@
               <a:rPr lang="en-US" dirty="0" smtClean="0"/>
               <a:t>CSS</a:t>
             </a:r>
-            <a:endParaRPr lang="en-US" dirty="0" smtClean="0"/>
           </a:p>
         </p:txBody>
       </p:sp>

</xml_diff>